<commit_message>
Various refactorings and WIP #32
- Enhanced code for static list of `CareerAdvice`s and `QuickHyperlink`s for `DashboardFragment`.
- `CareerAdvice`s no longer clickable if no URI is set for that advice. Just to make sure the user doesn't think clicking it should do something, in that case.
</commit_message>
<xml_diff>
--- a/WebIcons.pptx
+++ b/WebIcons.pptx
@@ -260,7 +260,7 @@
           <a:p>
             <a:fld id="{68AF1309-B7DE-4E6F-9EBF-15D541C0B178}" type="datetimeFigureOut">
               <a:rPr lang="en-US" smtClean="0"/>
-              <a:t>3/17/2022</a:t>
+              <a:t>3/22/2022</a:t>
             </a:fld>
             <a:endParaRPr lang="en-US"/>
           </a:p>
@@ -458,7 +458,7 @@
           <a:p>
             <a:fld id="{68AF1309-B7DE-4E6F-9EBF-15D541C0B178}" type="datetimeFigureOut">
               <a:rPr lang="en-US" smtClean="0"/>
-              <a:t>3/17/2022</a:t>
+              <a:t>3/22/2022</a:t>
             </a:fld>
             <a:endParaRPr lang="en-US"/>
           </a:p>
@@ -666,7 +666,7 @@
           <a:p>
             <a:fld id="{68AF1309-B7DE-4E6F-9EBF-15D541C0B178}" type="datetimeFigureOut">
               <a:rPr lang="en-US" smtClean="0"/>
-              <a:t>3/17/2022</a:t>
+              <a:t>3/22/2022</a:t>
             </a:fld>
             <a:endParaRPr lang="en-US"/>
           </a:p>
@@ -864,7 +864,7 @@
           <a:p>
             <a:fld id="{68AF1309-B7DE-4E6F-9EBF-15D541C0B178}" type="datetimeFigureOut">
               <a:rPr lang="en-US" smtClean="0"/>
-              <a:t>3/17/2022</a:t>
+              <a:t>3/22/2022</a:t>
             </a:fld>
             <a:endParaRPr lang="en-US"/>
           </a:p>
@@ -1139,7 +1139,7 @@
           <a:p>
             <a:fld id="{68AF1309-B7DE-4E6F-9EBF-15D541C0B178}" type="datetimeFigureOut">
               <a:rPr lang="en-US" smtClean="0"/>
-              <a:t>3/17/2022</a:t>
+              <a:t>3/22/2022</a:t>
             </a:fld>
             <a:endParaRPr lang="en-US"/>
           </a:p>
@@ -1404,7 +1404,7 @@
           <a:p>
             <a:fld id="{68AF1309-B7DE-4E6F-9EBF-15D541C0B178}" type="datetimeFigureOut">
               <a:rPr lang="en-US" smtClean="0"/>
-              <a:t>3/17/2022</a:t>
+              <a:t>3/22/2022</a:t>
             </a:fld>
             <a:endParaRPr lang="en-US"/>
           </a:p>
@@ -1816,7 +1816,7 @@
           <a:p>
             <a:fld id="{68AF1309-B7DE-4E6F-9EBF-15D541C0B178}" type="datetimeFigureOut">
               <a:rPr lang="en-US" smtClean="0"/>
-              <a:t>3/17/2022</a:t>
+              <a:t>3/22/2022</a:t>
             </a:fld>
             <a:endParaRPr lang="en-US"/>
           </a:p>
@@ -1957,7 +1957,7 @@
           <a:p>
             <a:fld id="{68AF1309-B7DE-4E6F-9EBF-15D541C0B178}" type="datetimeFigureOut">
               <a:rPr lang="en-US" smtClean="0"/>
-              <a:t>3/17/2022</a:t>
+              <a:t>3/22/2022</a:t>
             </a:fld>
             <a:endParaRPr lang="en-US"/>
           </a:p>
@@ -2070,7 +2070,7 @@
           <a:p>
             <a:fld id="{68AF1309-B7DE-4E6F-9EBF-15D541C0B178}" type="datetimeFigureOut">
               <a:rPr lang="en-US" smtClean="0"/>
-              <a:t>3/17/2022</a:t>
+              <a:t>3/22/2022</a:t>
             </a:fld>
             <a:endParaRPr lang="en-US"/>
           </a:p>
@@ -2381,7 +2381,7 @@
           <a:p>
             <a:fld id="{68AF1309-B7DE-4E6F-9EBF-15D541C0B178}" type="datetimeFigureOut">
               <a:rPr lang="en-US" smtClean="0"/>
-              <a:t>3/17/2022</a:t>
+              <a:t>3/22/2022</a:t>
             </a:fld>
             <a:endParaRPr lang="en-US"/>
           </a:p>
@@ -2669,7 +2669,7 @@
           <a:p>
             <a:fld id="{68AF1309-B7DE-4E6F-9EBF-15D541C0B178}" type="datetimeFigureOut">
               <a:rPr lang="en-US" smtClean="0"/>
-              <a:t>3/17/2022</a:t>
+              <a:t>3/22/2022</a:t>
             </a:fld>
             <a:endParaRPr lang="en-US"/>
           </a:p>
@@ -2910,7 +2910,7 @@
           <a:p>
             <a:fld id="{68AF1309-B7DE-4E6F-9EBF-15D541C0B178}" type="datetimeFigureOut">
               <a:rPr lang="en-US" smtClean="0"/>
-              <a:t>3/17/2022</a:t>
+              <a:t>3/22/2022</a:t>
             </a:fld>
             <a:endParaRPr lang="en-US"/>
           </a:p>
@@ -3937,6 +3937,105 @@
           </a:prstGeom>
         </p:spPr>
       </p:pic>
+      <p:grpSp>
+        <p:nvGrpSpPr>
+          <p:cNvPr id="12" name="Group 11">
+            <a:extLst>
+              <a:ext uri="{FF2B5EF4-FFF2-40B4-BE49-F238E27FC236}">
+                <a16:creationId xmlns:a16="http://schemas.microsoft.com/office/drawing/2014/main" id="{44642294-B5DC-4EE0-B608-5E2F3A292073}"/>
+              </a:ext>
+            </a:extLst>
+          </p:cNvPr>
+          <p:cNvGrpSpPr/>
+          <p:nvPr/>
+        </p:nvGrpSpPr>
+        <p:grpSpPr>
+          <a:xfrm>
+            <a:off x="360561" y="3273083"/>
+            <a:ext cx="2501417" cy="2501417"/>
+            <a:chOff x="360561" y="3273083"/>
+            <a:chExt cx="2501417" cy="2501417"/>
+          </a:xfrm>
+        </p:grpSpPr>
+        <p:pic>
+          <p:nvPicPr>
+            <p:cNvPr id="3" name="Graphic 2" descr="Flip calendar with solid fill">
+              <a:extLst>
+                <a:ext uri="{FF2B5EF4-FFF2-40B4-BE49-F238E27FC236}">
+                  <a16:creationId xmlns:a16="http://schemas.microsoft.com/office/drawing/2014/main" id="{4E103CA8-6159-4ECC-9115-617217D5D165}"/>
+                </a:ext>
+              </a:extLst>
+            </p:cNvPr>
+            <p:cNvPicPr>
+              <a:picLocks noChangeAspect="1"/>
+            </p:cNvPicPr>
+            <p:nvPr/>
+          </p:nvPicPr>
+          <p:blipFill>
+            <a:blip r:embed="rId5">
+              <a:extLst>
+                <a:ext uri="{28A0092B-C50C-407E-A947-70E740481C1C}">
+                  <a14:useLocalDpi xmlns:a14="http://schemas.microsoft.com/office/drawing/2010/main" val="0"/>
+                </a:ext>
+                <a:ext uri="{96DAC541-7B7A-43D3-8B79-37D633B846F1}">
+                  <asvg:svgBlip xmlns:asvg="http://schemas.microsoft.com/office/drawing/2016/SVG/main" r:embed="rId6"/>
+                </a:ext>
+              </a:extLst>
+            </a:blip>
+            <a:stretch>
+              <a:fillRect/>
+            </a:stretch>
+          </p:blipFill>
+          <p:spPr>
+            <a:xfrm>
+              <a:off x="360561" y="3273083"/>
+              <a:ext cx="2501417" cy="2501417"/>
+            </a:xfrm>
+            <a:prstGeom prst="rect">
+              <a:avLst/>
+            </a:prstGeom>
+          </p:spPr>
+        </p:pic>
+        <p:pic>
+          <p:nvPicPr>
+            <p:cNvPr id="10" name="Graphic 9" descr="Graduation cap with solid fill">
+              <a:extLst>
+                <a:ext uri="{FF2B5EF4-FFF2-40B4-BE49-F238E27FC236}">
+                  <a16:creationId xmlns:a16="http://schemas.microsoft.com/office/drawing/2014/main" id="{76251479-A639-4A01-B51A-00F4E2B69459}"/>
+                </a:ext>
+              </a:extLst>
+            </p:cNvPr>
+            <p:cNvPicPr>
+              <a:picLocks noChangeAspect="1"/>
+            </p:cNvPicPr>
+            <p:nvPr/>
+          </p:nvPicPr>
+          <p:blipFill>
+            <a:blip r:embed="rId7">
+              <a:extLst>
+                <a:ext uri="{28A0092B-C50C-407E-A947-70E740481C1C}">
+                  <a14:useLocalDpi xmlns:a14="http://schemas.microsoft.com/office/drawing/2010/main" val="0"/>
+                </a:ext>
+                <a:ext uri="{96DAC541-7B7A-43D3-8B79-37D633B846F1}">
+                  <asvg:svgBlip xmlns:asvg="http://schemas.microsoft.com/office/drawing/2016/SVG/main" r:embed="rId8"/>
+                </a:ext>
+              </a:extLst>
+            </a:blip>
+            <a:stretch>
+              <a:fillRect/>
+            </a:stretch>
+          </p:blipFill>
+          <p:spPr>
+            <a:xfrm>
+              <a:off x="1039399" y="4250185"/>
+              <a:ext cx="1143740" cy="1143740"/>
+            </a:xfrm>
+            <a:prstGeom prst="rect">
+              <a:avLst/>
+            </a:prstGeom>
+          </p:spPr>
+        </p:pic>
+      </p:grpSp>
     </p:spTree>
     <p:extLst>
       <p:ext uri="{BB962C8B-B14F-4D97-AF65-F5344CB8AC3E}">

</xml_diff>

<commit_message>
Small changes for `DashboardFragment`
- Added one advice and one link.
- Incoming events now sorted by proximity.
</commit_message>
<xml_diff>
--- a/WebIcons.pptx
+++ b/WebIcons.pptx
@@ -260,7 +260,7 @@
           <a:p>
             <a:fld id="{68AF1309-B7DE-4E6F-9EBF-15D541C0B178}" type="datetimeFigureOut">
               <a:rPr lang="en-US" smtClean="0"/>
-              <a:t>3/22/2022</a:t>
+              <a:t>3/25/2022</a:t>
             </a:fld>
             <a:endParaRPr lang="en-US"/>
           </a:p>
@@ -458,7 +458,7 @@
           <a:p>
             <a:fld id="{68AF1309-B7DE-4E6F-9EBF-15D541C0B178}" type="datetimeFigureOut">
               <a:rPr lang="en-US" smtClean="0"/>
-              <a:t>3/22/2022</a:t>
+              <a:t>3/25/2022</a:t>
             </a:fld>
             <a:endParaRPr lang="en-US"/>
           </a:p>
@@ -666,7 +666,7 @@
           <a:p>
             <a:fld id="{68AF1309-B7DE-4E6F-9EBF-15D541C0B178}" type="datetimeFigureOut">
               <a:rPr lang="en-US" smtClean="0"/>
-              <a:t>3/22/2022</a:t>
+              <a:t>3/25/2022</a:t>
             </a:fld>
             <a:endParaRPr lang="en-US"/>
           </a:p>
@@ -864,7 +864,7 @@
           <a:p>
             <a:fld id="{68AF1309-B7DE-4E6F-9EBF-15D541C0B178}" type="datetimeFigureOut">
               <a:rPr lang="en-US" smtClean="0"/>
-              <a:t>3/22/2022</a:t>
+              <a:t>3/25/2022</a:t>
             </a:fld>
             <a:endParaRPr lang="en-US"/>
           </a:p>
@@ -1139,7 +1139,7 @@
           <a:p>
             <a:fld id="{68AF1309-B7DE-4E6F-9EBF-15D541C0B178}" type="datetimeFigureOut">
               <a:rPr lang="en-US" smtClean="0"/>
-              <a:t>3/22/2022</a:t>
+              <a:t>3/25/2022</a:t>
             </a:fld>
             <a:endParaRPr lang="en-US"/>
           </a:p>
@@ -1404,7 +1404,7 @@
           <a:p>
             <a:fld id="{68AF1309-B7DE-4E6F-9EBF-15D541C0B178}" type="datetimeFigureOut">
               <a:rPr lang="en-US" smtClean="0"/>
-              <a:t>3/22/2022</a:t>
+              <a:t>3/25/2022</a:t>
             </a:fld>
             <a:endParaRPr lang="en-US"/>
           </a:p>
@@ -1816,7 +1816,7 @@
           <a:p>
             <a:fld id="{68AF1309-B7DE-4E6F-9EBF-15D541C0B178}" type="datetimeFigureOut">
               <a:rPr lang="en-US" smtClean="0"/>
-              <a:t>3/22/2022</a:t>
+              <a:t>3/25/2022</a:t>
             </a:fld>
             <a:endParaRPr lang="en-US"/>
           </a:p>
@@ -1957,7 +1957,7 @@
           <a:p>
             <a:fld id="{68AF1309-B7DE-4E6F-9EBF-15D541C0B178}" type="datetimeFigureOut">
               <a:rPr lang="en-US" smtClean="0"/>
-              <a:t>3/22/2022</a:t>
+              <a:t>3/25/2022</a:t>
             </a:fld>
             <a:endParaRPr lang="en-US"/>
           </a:p>
@@ -2070,7 +2070,7 @@
           <a:p>
             <a:fld id="{68AF1309-B7DE-4E6F-9EBF-15D541C0B178}" type="datetimeFigureOut">
               <a:rPr lang="en-US" smtClean="0"/>
-              <a:t>3/22/2022</a:t>
+              <a:t>3/25/2022</a:t>
             </a:fld>
             <a:endParaRPr lang="en-US"/>
           </a:p>
@@ -2381,7 +2381,7 @@
           <a:p>
             <a:fld id="{68AF1309-B7DE-4E6F-9EBF-15D541C0B178}" type="datetimeFigureOut">
               <a:rPr lang="en-US" smtClean="0"/>
-              <a:t>3/22/2022</a:t>
+              <a:t>3/25/2022</a:t>
             </a:fld>
             <a:endParaRPr lang="en-US"/>
           </a:p>
@@ -2669,7 +2669,7 @@
           <a:p>
             <a:fld id="{68AF1309-B7DE-4E6F-9EBF-15D541C0B178}" type="datetimeFigureOut">
               <a:rPr lang="en-US" smtClean="0"/>
-              <a:t>3/22/2022</a:t>
+              <a:t>3/25/2022</a:t>
             </a:fld>
             <a:endParaRPr lang="en-US"/>
           </a:p>
@@ -2910,7 +2910,7 @@
           <a:p>
             <a:fld id="{68AF1309-B7DE-4E6F-9EBF-15D541C0B178}" type="datetimeFigureOut">
               <a:rPr lang="en-US" smtClean="0"/>
-              <a:t>3/22/2022</a:t>
+              <a:t>3/25/2022</a:t>
             </a:fld>
             <a:endParaRPr lang="en-US"/>
           </a:p>
@@ -3313,6 +3313,21 @@
 <file path=ppt/slides/slide1.xml><?xml version="1.0" encoding="utf-8"?>
 <p:sld xmlns:a="http://schemas.openxmlformats.org/drawingml/2006/main" xmlns:r="http://schemas.openxmlformats.org/officeDocument/2006/relationships" xmlns:p="http://schemas.openxmlformats.org/presentationml/2006/main">
   <p:cSld>
+    <p:bg>
+      <p:bgPr>
+        <a:pattFill prst="shingle">
+          <a:fgClr>
+            <a:schemeClr val="bg1">
+              <a:lumMod val="85000"/>
+            </a:schemeClr>
+          </a:fgClr>
+          <a:bgClr>
+            <a:schemeClr val="bg1"/>
+          </a:bgClr>
+        </a:pattFill>
+        <a:effectLst/>
+      </p:bgPr>
+    </p:bg>
     <p:spTree>
       <p:nvGrpSpPr>
         <p:cNvPr id="1" name=""/>
@@ -3815,6 +3830,21 @@
 <file path=ppt/slides/slide2.xml><?xml version="1.0" encoding="utf-8"?>
 <p:sld xmlns:a="http://schemas.openxmlformats.org/drawingml/2006/main" xmlns:r="http://schemas.openxmlformats.org/officeDocument/2006/relationships" xmlns:p="http://schemas.openxmlformats.org/presentationml/2006/main">
   <p:cSld>
+    <p:bg>
+      <p:bgPr>
+        <a:pattFill prst="shingle">
+          <a:fgClr>
+            <a:schemeClr val="bg1">
+              <a:lumMod val="85000"/>
+            </a:schemeClr>
+          </a:fgClr>
+          <a:bgClr>
+            <a:schemeClr val="bg1"/>
+          </a:bgClr>
+        </a:pattFill>
+        <a:effectLst/>
+      </p:bgPr>
+    </p:bg>
     <p:spTree>
       <p:nvGrpSpPr>
         <p:cNvPr id="1" name=""/>
@@ -4036,6 +4066,45 @@
           </p:spPr>
         </p:pic>
       </p:grpSp>
+      <p:pic>
+        <p:nvPicPr>
+          <p:cNvPr id="4" name="Graphic 3" descr="Books on shelf with solid fill">
+            <a:extLst>
+              <a:ext uri="{FF2B5EF4-FFF2-40B4-BE49-F238E27FC236}">
+                <a16:creationId xmlns:a16="http://schemas.microsoft.com/office/drawing/2014/main" id="{356FBF62-2F11-447C-BD4F-23D55A8F3061}"/>
+              </a:ext>
+            </a:extLst>
+          </p:cNvPr>
+          <p:cNvPicPr>
+            <a:picLocks noChangeAspect="1"/>
+          </p:cNvPicPr>
+          <p:nvPr/>
+        </p:nvPicPr>
+        <p:blipFill>
+          <a:blip r:embed="rId9">
+            <a:extLst>
+              <a:ext uri="{28A0092B-C50C-407E-A947-70E740481C1C}">
+                <a14:useLocalDpi xmlns:a14="http://schemas.microsoft.com/office/drawing/2010/main" val="0"/>
+              </a:ext>
+              <a:ext uri="{96DAC541-7B7A-43D3-8B79-37D633B846F1}">
+                <asvg:svgBlip xmlns:asvg="http://schemas.microsoft.com/office/drawing/2016/SVG/main" r:embed="rId10"/>
+              </a:ext>
+            </a:extLst>
+          </a:blip>
+          <a:stretch>
+            <a:fillRect/>
+          </a:stretch>
+        </p:blipFill>
+        <p:spPr>
+          <a:xfrm>
+            <a:off x="7201877" y="428897"/>
+            <a:ext cx="1905312" cy="1905312"/>
+          </a:xfrm>
+          <a:prstGeom prst="rect">
+            <a:avLst/>
+          </a:prstGeom>
+        </p:spPr>
+      </p:pic>
     </p:spTree>
     <p:extLst>
       <p:ext uri="{BB962C8B-B14F-4D97-AF65-F5344CB8AC3E}">

</xml_diff>

<commit_message>
Offline catalog updated and advice added
</commit_message>
<xml_diff>
--- a/WebIcons.pptx
+++ b/WebIcons.pptx
@@ -260,7 +260,7 @@
           <a:p>
             <a:fld id="{68AF1309-B7DE-4E6F-9EBF-15D541C0B178}" type="datetimeFigureOut">
               <a:rPr lang="en-US" smtClean="0"/>
-              <a:t>3/25/2022</a:t>
+              <a:t>3/30/2022</a:t>
             </a:fld>
             <a:endParaRPr lang="en-US"/>
           </a:p>
@@ -458,7 +458,7 @@
           <a:p>
             <a:fld id="{68AF1309-B7DE-4E6F-9EBF-15D541C0B178}" type="datetimeFigureOut">
               <a:rPr lang="en-US" smtClean="0"/>
-              <a:t>3/25/2022</a:t>
+              <a:t>3/30/2022</a:t>
             </a:fld>
             <a:endParaRPr lang="en-US"/>
           </a:p>
@@ -666,7 +666,7 @@
           <a:p>
             <a:fld id="{68AF1309-B7DE-4E6F-9EBF-15D541C0B178}" type="datetimeFigureOut">
               <a:rPr lang="en-US" smtClean="0"/>
-              <a:t>3/25/2022</a:t>
+              <a:t>3/30/2022</a:t>
             </a:fld>
             <a:endParaRPr lang="en-US"/>
           </a:p>
@@ -864,7 +864,7 @@
           <a:p>
             <a:fld id="{68AF1309-B7DE-4E6F-9EBF-15D541C0B178}" type="datetimeFigureOut">
               <a:rPr lang="en-US" smtClean="0"/>
-              <a:t>3/25/2022</a:t>
+              <a:t>3/30/2022</a:t>
             </a:fld>
             <a:endParaRPr lang="en-US"/>
           </a:p>
@@ -1139,7 +1139,7 @@
           <a:p>
             <a:fld id="{68AF1309-B7DE-4E6F-9EBF-15D541C0B178}" type="datetimeFigureOut">
               <a:rPr lang="en-US" smtClean="0"/>
-              <a:t>3/25/2022</a:t>
+              <a:t>3/30/2022</a:t>
             </a:fld>
             <a:endParaRPr lang="en-US"/>
           </a:p>
@@ -1404,7 +1404,7 @@
           <a:p>
             <a:fld id="{68AF1309-B7DE-4E6F-9EBF-15D541C0B178}" type="datetimeFigureOut">
               <a:rPr lang="en-US" smtClean="0"/>
-              <a:t>3/25/2022</a:t>
+              <a:t>3/30/2022</a:t>
             </a:fld>
             <a:endParaRPr lang="en-US"/>
           </a:p>
@@ -1816,7 +1816,7 @@
           <a:p>
             <a:fld id="{68AF1309-B7DE-4E6F-9EBF-15D541C0B178}" type="datetimeFigureOut">
               <a:rPr lang="en-US" smtClean="0"/>
-              <a:t>3/25/2022</a:t>
+              <a:t>3/30/2022</a:t>
             </a:fld>
             <a:endParaRPr lang="en-US"/>
           </a:p>
@@ -1957,7 +1957,7 @@
           <a:p>
             <a:fld id="{68AF1309-B7DE-4E6F-9EBF-15D541C0B178}" type="datetimeFigureOut">
               <a:rPr lang="en-US" smtClean="0"/>
-              <a:t>3/25/2022</a:t>
+              <a:t>3/30/2022</a:t>
             </a:fld>
             <a:endParaRPr lang="en-US"/>
           </a:p>
@@ -2070,7 +2070,7 @@
           <a:p>
             <a:fld id="{68AF1309-B7DE-4E6F-9EBF-15D541C0B178}" type="datetimeFigureOut">
               <a:rPr lang="en-US" smtClean="0"/>
-              <a:t>3/25/2022</a:t>
+              <a:t>3/30/2022</a:t>
             </a:fld>
             <a:endParaRPr lang="en-US"/>
           </a:p>
@@ -2381,7 +2381,7 @@
           <a:p>
             <a:fld id="{68AF1309-B7DE-4E6F-9EBF-15D541C0B178}" type="datetimeFigureOut">
               <a:rPr lang="en-US" smtClean="0"/>
-              <a:t>3/25/2022</a:t>
+              <a:t>3/30/2022</a:t>
             </a:fld>
             <a:endParaRPr lang="en-US"/>
           </a:p>
@@ -2669,7 +2669,7 @@
           <a:p>
             <a:fld id="{68AF1309-B7DE-4E6F-9EBF-15D541C0B178}" type="datetimeFigureOut">
               <a:rPr lang="en-US" smtClean="0"/>
-              <a:t>3/25/2022</a:t>
+              <a:t>3/30/2022</a:t>
             </a:fld>
             <a:endParaRPr lang="en-US"/>
           </a:p>
@@ -2910,7 +2910,7 @@
           <a:p>
             <a:fld id="{68AF1309-B7DE-4E6F-9EBF-15D541C0B178}" type="datetimeFigureOut">
               <a:rPr lang="en-US" smtClean="0"/>
-              <a:t>3/25/2022</a:t>
+              <a:t>3/30/2022</a:t>
             </a:fld>
             <a:endParaRPr lang="en-US"/>
           </a:p>
@@ -3370,7 +3370,7 @@
         </p:blipFill>
         <p:spPr>
           <a:xfrm>
-            <a:off x="9765782" y="3756626"/>
+            <a:off x="9748896" y="4767308"/>
             <a:ext cx="2067781" cy="2067781"/>
           </a:xfrm>
           <a:prstGeom prst="rect">
@@ -3554,7 +3554,7 @@
         </p:blipFill>
         <p:spPr>
           <a:xfrm>
-            <a:off x="7698001" y="3756626"/>
+            <a:off x="7681115" y="4767308"/>
             <a:ext cx="2067781" cy="2067781"/>
           </a:xfrm>
           <a:prstGeom prst="rect">
@@ -3698,7 +3698,7 @@
         </p:blipFill>
         <p:spPr>
           <a:xfrm>
-            <a:off x="5630220" y="3756626"/>
+            <a:off x="5613334" y="4767308"/>
             <a:ext cx="2067781" cy="2067781"/>
           </a:xfrm>
           <a:prstGeom prst="rect">
@@ -3734,7 +3734,7 @@
         </p:blipFill>
         <p:spPr>
           <a:xfrm>
-            <a:off x="3562439" y="3756627"/>
+            <a:off x="3545553" y="4767309"/>
             <a:ext cx="2067781" cy="2067781"/>
           </a:xfrm>
           <a:prstGeom prst="rect">
@@ -3770,8 +3770,8 @@
         </p:blipFill>
         <p:spPr>
           <a:xfrm>
-            <a:off x="2137403" y="2521077"/>
-            <a:ext cx="1847211" cy="1847211"/>
+            <a:off x="2511664" y="2596840"/>
+            <a:ext cx="2067780" cy="2067780"/>
           </a:xfrm>
           <a:prstGeom prst="rect">
             <a:avLst/>
@@ -3806,8 +3806,8 @@
         </p:blipFill>
         <p:spPr>
           <a:xfrm>
-            <a:off x="290192" y="2521077"/>
-            <a:ext cx="1847211" cy="1847211"/>
+            <a:off x="443883" y="2596839"/>
+            <a:ext cx="2067781" cy="2067781"/>
           </a:xfrm>
           <a:prstGeom prst="rect">
             <a:avLst/>
@@ -4098,6 +4098,42 @@
         <p:spPr>
           <a:xfrm>
             <a:off x="7201877" y="428897"/>
+            <a:ext cx="1905312" cy="1905312"/>
+          </a:xfrm>
+          <a:prstGeom prst="rect">
+            <a:avLst/>
+          </a:prstGeom>
+        </p:spPr>
+      </p:pic>
+      <p:pic>
+        <p:nvPicPr>
+          <p:cNvPr id="6" name="Picture 5" descr="Logo&#10;&#10;Description automatically generated">
+            <a:extLst>
+              <a:ext uri="{FF2B5EF4-FFF2-40B4-BE49-F238E27FC236}">
+                <a16:creationId xmlns:a16="http://schemas.microsoft.com/office/drawing/2014/main" id="{77F19586-A57F-41EE-AA08-F0879E9BAD44}"/>
+              </a:ext>
+            </a:extLst>
+          </p:cNvPr>
+          <p:cNvPicPr>
+            <a:picLocks noChangeAspect="1"/>
+          </p:cNvPicPr>
+          <p:nvPr/>
+        </p:nvPicPr>
+        <p:blipFill>
+          <a:blip r:embed="rId11">
+            <a:extLst>
+              <a:ext uri="{28A0092B-C50C-407E-A947-70E740481C1C}">
+                <a14:useLocalDpi xmlns:a14="http://schemas.microsoft.com/office/drawing/2010/main" val="0"/>
+              </a:ext>
+            </a:extLst>
+          </a:blip>
+          <a:stretch>
+            <a:fillRect/>
+          </a:stretch>
+        </p:blipFill>
+        <p:spPr>
+          <a:xfrm>
+            <a:off x="9112764" y="428897"/>
             <a:ext cx="1905312" cy="1905312"/>
           </a:xfrm>
           <a:prstGeom prst="rect">

</xml_diff>